<commit_message>
Updated reproducible research presentation, reformats and some speaker notes.
</commit_message>
<xml_diff>
--- a/basics0/src/good-documentation.pptx
+++ b/basics0/src/good-documentation.pptx
@@ -5,7 +5,7 @@
     <p:sldMasterId id="2147483648" r:id="rId1"/>
   </p:sldMasterIdLst>
   <p:notesMasterIdLst>
-    <p:NotesMasterId r:id="rId25"/>
+    <p:NotesMasterId r:id="rId28"/>
   </p:notesMasterIdLst>
   <p:sldIdLst>
     <p:sldId id="256" r:id="rId2"/>
@@ -31,6 +31,9 @@
     <p:sldId id="276" r:id="rId22"/>
     <p:sldId id="277" r:id="rId23"/>
     <p:sldId id="278" r:id="rId24"/>
+    <p:sldId id="279" r:id="rId25"/>
+    <p:sldId id="280" r:id="rId26"/>
+    <p:sldId id="281" r:id="rId27"/>
   </p:sldIdLst>
   <p:sldSz cx="9144000" cy="6858000" type="screen4x3"/>
   <p:notesSz cx="6858000" cy="9144000"/>
@@ -6784,6 +6787,132 @@
               <a:t>myself.</a:t>
             </a:r>
           </a:p>
+          <a:p>
+            <a:pPr lvl="0" marL="0" indent="0">
+              <a:buNone/>
+            </a:pPr>
+          </a:p>
+          <a:p>
+            <a:pPr lvl="0" marL="0" indent="0">
+              <a:buNone/>
+            </a:pPr>
+            <a:r>
+              <a:rPr/>
+              <a:t>You</a:t>
+            </a:r>
+            <a:r>
+              <a:rPr/>
+              <a:t> </a:t>
+            </a:r>
+            <a:r>
+              <a:rPr/>
+              <a:t>might</a:t>
+            </a:r>
+            <a:r>
+              <a:rPr/>
+              <a:t> </a:t>
+            </a:r>
+            <a:r>
+              <a:rPr/>
+              <a:t>find</a:t>
+            </a:r>
+            <a:r>
+              <a:rPr/>
+              <a:t> </a:t>
+            </a:r>
+            <a:r>
+              <a:rPr/>
+              <a:t>some</a:t>
+            </a:r>
+            <a:r>
+              <a:rPr/>
+              <a:t> </a:t>
+            </a:r>
+            <a:r>
+              <a:rPr/>
+              <a:t>of</a:t>
+            </a:r>
+            <a:r>
+              <a:rPr/>
+              <a:t> </a:t>
+            </a:r>
+            <a:r>
+              <a:rPr/>
+              <a:t>this,</a:t>
+            </a:r>
+            <a:r>
+              <a:rPr/>
+              <a:t> </a:t>
+            </a:r>
+            <a:r>
+              <a:rPr/>
+              <a:t>however,</a:t>
+            </a:r>
+            <a:r>
+              <a:rPr/>
+              <a:t> </a:t>
+            </a:r>
+            <a:r>
+              <a:rPr/>
+              <a:t>in</a:t>
+            </a:r>
+            <a:r>
+              <a:rPr/>
+              <a:t> </a:t>
+            </a:r>
+            <a:r>
+              <a:rPr/>
+              <a:t>other</a:t>
+            </a:r>
+            <a:r>
+              <a:rPr/>
+              <a:t> </a:t>
+            </a:r>
+            <a:r>
+              <a:rPr/>
+              <a:t>files</a:t>
+            </a:r>
+            <a:r>
+              <a:rPr/>
+              <a:t> </a:t>
+            </a:r>
+            <a:r>
+              <a:rPr/>
+              <a:t>in</a:t>
+            </a:r>
+            <a:r>
+              <a:rPr/>
+              <a:t> </a:t>
+            </a:r>
+            <a:r>
+              <a:rPr/>
+              <a:t>the</a:t>
+            </a:r>
+            <a:r>
+              <a:rPr/>
+              <a:t> </a:t>
+            </a:r>
+            <a:r>
+              <a:rPr/>
+              <a:t>repository</a:t>
+            </a:r>
+            <a:r>
+              <a:rPr/>
+              <a:t> </a:t>
+            </a:r>
+            <a:r>
+              <a:rPr/>
+              <a:t>listed</a:t>
+            </a:r>
+            <a:r>
+              <a:rPr/>
+              <a:t> </a:t>
+            </a:r>
+            <a:r>
+              <a:rPr/>
+              <a:t>here.</a:t>
+            </a:r>
+          </a:p>
         </p:txBody>
       </p:sp>
       <p:sp>
@@ -13213,7 +13342,7 @@
             </a:r>
             <a:r>
               <a:rPr/>
-              <a:t>thoug</a:t>
+              <a:t>though</a:t>
             </a:r>
             <a:r>
               <a:rPr/>
@@ -21909,10 +22038,15 @@
               </a:rPr>
               <a:t>Required arguments: 
     words – the variable list 
-    str – the text string to add to each variable in the &amp;words list 
+    str – the text string to add to each variable
+          in the &amp;words list 
 Optional arguments: 
-    location – whether to add the text string as a prefix or suffix [prefix|suffix, default: suffix] 
-    delim – the character(s) separating each variable in the &amp;words list [default: space] </a:t>
+    location – whether to add the text string as
+               a prefix or suffix [prefix|suffix, 
+               default: suffix] 
+    delim – the character(s) separating each 
+            variable in the &amp;words list
+            [default: space] </a:t>
             </a:r>
           </a:p>
         </p:txBody>
@@ -22035,9 +22169,12 @@
                 <a:latin typeface="Courier"/>
               </a:rPr>
               <a:t>Examples: 
-    %put %add_string(a b c, _max);                      *produces the text a_max b_max c_max;            
-    %put %add_string(a b c, max_, location=prefix);     *produces the text max_a max_b max_c;            
-    %put %add_string(%str(a,b,c), _max, delim=%str(,)); *produces the text a_max,b_max,c_max;</a:t>
+  %put %add_string(a b c, _max);
+    *produces the text a_max b_max c_max;            
+  %put %add_string(a b c, max_, location=prefix);
+    *produces the text max_a max_b max_c;            
+  %put %add_string(%str(a,b,c), _max, delim=%str(,));
+    *produces the text a_max,b_max,c_max;</a:t>
             </a:r>
           </a:p>
         </p:txBody>
@@ -22160,10 +22297,10 @@
                 <a:latin typeface="Courier"/>
               </a:rPr>
               <a:t>Credit:
-    source code from Robert J. Morris, 
-    Text Utility Macros for Manipulating
-    Lists of Variable Names (SUGI 30, 2005)
-    www2.sas.com/proceedings/sugi30/029-30.pdf           </a:t>
+  source code from Robert J. Morris, Text
+  Utility Macros for Manipulating Lists of 
+  Variable Names (SUGI 30, 2005)
+  www2.sas.com/proceedings/sugi30/029-30.pdf           </a:t>
             </a:r>
           </a:p>
         </p:txBody>
@@ -22379,7 +22516,7 @@
             <a:pPr lvl="1"/>
             <a:r>
               <a:rPr/>
-              <a:t>This presentation was written on 2019-06-05 and was last modified on 2019-06-08.</a:t>
+              <a:t>This presentation was written on 2019-06-05 and was last modified on 2019-07-21.</a:t>
             </a:r>
           </a:p>
         </p:txBody>
@@ -22426,7 +22563,23 @@
             </a:pPr>
             <a:r>
               <a:rPr/>
-              <a:t>Documentation</a:t>
+              <a:t>Documentation,</a:t>
+            </a:r>
+            <a:r>
+              <a:rPr/>
+              <a:t> </a:t>
+            </a:r>
+            <a:r>
+              <a:rPr/>
+              <a:t>example</a:t>
+            </a:r>
+            <a:r>
+              <a:rPr/>
+              <a:t> </a:t>
+            </a:r>
+            <a:r>
+              <a:rPr/>
+              <a:t>#2</a:t>
             </a:r>
           </a:p>
         </p:txBody>
@@ -22604,10 +22757,56 @@
               <a:buNone/>
             </a:pPr>
             <a:r>
-              <a:rPr>
-                <a:hlinkClick r:id="rId2"/>
-              </a:rPr>
-              <a:t>https://github.com/FinancialRiskGroup/SASPerformanceAnalytics</a:t>
+              <a:rPr/>
+              <a:t>Documentation</a:t>
+            </a:r>
+            <a:r>
+              <a:rPr/>
+              <a:t> </a:t>
+            </a:r>
+            <a:r>
+              <a:rPr/>
+              <a:t>example</a:t>
+            </a:r>
+            <a:r>
+              <a:rPr/>
+              <a:t> </a:t>
+            </a:r>
+            <a:r>
+              <a:rPr/>
+              <a:t>#2,</a:t>
+            </a:r>
+            <a:r>
+              <a:rPr/>
+              <a:t> </a:t>
+            </a:r>
+            <a:r>
+              <a:rPr/>
+              <a:t>snippet</a:t>
+            </a:r>
+            <a:r>
+              <a:rPr/>
+              <a:t> </a:t>
+            </a:r>
+            <a:r>
+              <a:rPr/>
+              <a:t>1</a:t>
+            </a:r>
+            <a:r>
+              <a:rPr/>
+              <a:t> </a:t>
+            </a:r>
+            <a:r>
+              <a:rPr/>
+              <a:t>of</a:t>
+            </a:r>
+            <a:r>
+              <a:rPr/>
+              <a:t> </a:t>
+            </a:r>
+            <a:r>
+              <a:rPr/>
+              <a:t>4.</a:t>
             </a:r>
           </a:p>
         </p:txBody>
@@ -22634,31 +22833,16 @@
               <a:rPr sz="1800">
                 <a:latin typeface="Courier"/>
               </a:rPr>
-              <a:t>/*---------------------------------------------------------------
+              <a:t>/*-----------------------------------------------
 * NAME: ActivePremium.sas
 *
-* PURPOSE: Cacluate the return on an investment's annualized return minus the benchmark's annualized return.
+* PURPOSE: Cacluate the return on an investment's
+* annualized return minus the benchmark's 
+* annualized return.
 *
 * NOTES: Also known as active return.
-*        Active premium= Investment's annualized return- Benchmark's annualized return. 
-*
-* MACRO OPTIONS:
-* returns - Required.  Data Set containing returns.
-* BM - Required.  Specifies the variable name of benchmark asset or index in the returns data set.
-* scale - Optional. Number of periods in a year {any positive integer, ie daily scale= 252, monthly scale= 12, quarterly scale= 4}.
-          Default=1
-* method - Optional. Specifies either DISCRETE or LOG chaining method {DISCRETE, LOG}.  
-           Default=DISCRETE
-* dateColumn - Optional. Date column in Data Set. Default=DATE
-* outData - Optional. Output Data Set with active premium.  Default="active_premium"
-*
-* MODIFIED:
-* 7/22/2015 – CJ - Initial Creation
-* 3/05/2016 – RM - Comments modification  
-* 3/09/2016 - QY - Parameter consistency 
-*
-* Copyright (c) 2015 by The Financial Risk Group, Cary, NC, USA.
-*-------------------------------------------------------------*/</a:t>
+*        Active premium= Investment's annualized 
+*    return - Benchmark's annualized return. </a:t>
             </a:r>
           </a:p>
         </p:txBody>
@@ -22706,6 +22890,450 @@
             <a:r>
               <a:rPr/>
               <a:t>Documentation</a:t>
+            </a:r>
+            <a:r>
+              <a:rPr/>
+              <a:t> </a:t>
+            </a:r>
+            <a:r>
+              <a:rPr/>
+              <a:t>example</a:t>
+            </a:r>
+            <a:r>
+              <a:rPr/>
+              <a:t> </a:t>
+            </a:r>
+            <a:r>
+              <a:rPr/>
+              <a:t>#2,</a:t>
+            </a:r>
+            <a:r>
+              <a:rPr/>
+              <a:t> </a:t>
+            </a:r>
+            <a:r>
+              <a:rPr/>
+              <a:t>snippet</a:t>
+            </a:r>
+            <a:r>
+              <a:rPr/>
+              <a:t> </a:t>
+            </a:r>
+            <a:r>
+              <a:rPr/>
+              <a:t>2</a:t>
+            </a:r>
+            <a:r>
+              <a:rPr/>
+              <a:t> </a:t>
+            </a:r>
+            <a:r>
+              <a:rPr/>
+              <a:t>of</a:t>
+            </a:r>
+            <a:r>
+              <a:rPr/>
+              <a:t> </a:t>
+            </a:r>
+            <a:r>
+              <a:rPr/>
+              <a:t>4.</a:t>
+            </a:r>
+          </a:p>
+        </p:txBody>
+      </p:sp>
+      <p:sp>
+        <p:nvSpPr>
+          <p:cNvPr id="3" name="Content Placeholder 2"/>
+          <p:cNvSpPr>
+            <a:spLocks noGrp="1"/>
+          </p:cNvSpPr>
+          <p:nvPr>
+            <p:ph idx="1"/>
+          </p:nvPr>
+        </p:nvSpPr>
+        <p:spPr/>
+        <p:txBody>
+          <a:bodyPr/>
+          <a:lstStyle/>
+          <a:p>
+            <a:pPr lvl="0" marL="1270000" indent="0">
+              <a:buNone/>
+            </a:pPr>
+            <a:r>
+              <a:rPr sz="1800">
+                <a:latin typeface="Courier"/>
+              </a:rPr>
+              <a:t>* MACRO OPTIONS:
+* returns - Required.  Data Set containing 
+*           returns.
+* BM - Required.  Specifies the variable 
+*      name of benchmark asset or index 
+*      in the returns data set.
+* scale - Optional. Number of periods in a
+*         year {any positive integer, ie 
+*         daily scale= 252, monthly scale
+*         = 12, quarterly scale= 4}.
+*         Default=1</a:t>
+            </a:r>
+          </a:p>
+        </p:txBody>
+      </p:sp>
+    </p:spTree>
+  </p:cSld>
+</p:sld>
+</file>
+
+<file path=ppt/slides/slide23.xml><?xml version="1.0" encoding="utf-8"?>
+<p:sld xmlns:a="http://schemas.openxmlformats.org/drawingml/2006/main" xmlns:r="http://schemas.openxmlformats.org/officeDocument/2006/relationships" xmlns:p="http://schemas.openxmlformats.org/presentationml/2006/main">
+  <p:cSld>
+    <p:spTree>
+      <p:nvGrpSpPr>
+        <p:cNvPr id="1" name=""/>
+        <p:cNvGrpSpPr/>
+        <p:nvPr/>
+      </p:nvGrpSpPr>
+      <p:grpSpPr>
+        <a:xfrm>
+          <a:off x="0" y="0"/>
+          <a:ext cx="0" cy="0"/>
+          <a:chOff x="0" y="0"/>
+          <a:chExt cx="0" cy="0"/>
+        </a:xfrm>
+      </p:grpSpPr>
+      <p:sp>
+        <p:nvSpPr>
+          <p:cNvPr id="2" name="Title 1"/>
+          <p:cNvSpPr>
+            <a:spLocks noGrp="1"/>
+          </p:cNvSpPr>
+          <p:nvPr>
+            <p:ph type="title"/>
+          </p:nvPr>
+        </p:nvSpPr>
+        <p:spPr/>
+        <p:txBody>
+          <a:bodyPr/>
+          <a:lstStyle/>
+          <a:p>
+            <a:pPr lvl="0" marL="0" indent="0">
+              <a:buNone/>
+            </a:pPr>
+            <a:r>
+              <a:rPr/>
+              <a:t>Documentation</a:t>
+            </a:r>
+            <a:r>
+              <a:rPr/>
+              <a:t> </a:t>
+            </a:r>
+            <a:r>
+              <a:rPr/>
+              <a:t>example</a:t>
+            </a:r>
+            <a:r>
+              <a:rPr/>
+              <a:t> </a:t>
+            </a:r>
+            <a:r>
+              <a:rPr/>
+              <a:t>#2,</a:t>
+            </a:r>
+            <a:r>
+              <a:rPr/>
+              <a:t> </a:t>
+            </a:r>
+            <a:r>
+              <a:rPr/>
+              <a:t>snippet</a:t>
+            </a:r>
+            <a:r>
+              <a:rPr/>
+              <a:t> </a:t>
+            </a:r>
+            <a:r>
+              <a:rPr/>
+              <a:t>3</a:t>
+            </a:r>
+            <a:r>
+              <a:rPr/>
+              <a:t> </a:t>
+            </a:r>
+            <a:r>
+              <a:rPr/>
+              <a:t>of</a:t>
+            </a:r>
+            <a:r>
+              <a:rPr/>
+              <a:t> </a:t>
+            </a:r>
+            <a:r>
+              <a:rPr/>
+              <a:t>4.</a:t>
+            </a:r>
+          </a:p>
+        </p:txBody>
+      </p:sp>
+      <p:sp>
+        <p:nvSpPr>
+          <p:cNvPr id="3" name="Content Placeholder 2"/>
+          <p:cNvSpPr>
+            <a:spLocks noGrp="1"/>
+          </p:cNvSpPr>
+          <p:nvPr>
+            <p:ph idx="1"/>
+          </p:nvPr>
+        </p:nvSpPr>
+        <p:spPr/>
+        <p:txBody>
+          <a:bodyPr/>
+          <a:lstStyle/>
+          <a:p>
+            <a:pPr lvl="0" marL="1270000" indent="0">
+              <a:buNone/>
+            </a:pPr>
+            <a:r>
+              <a:rPr sz="1800">
+                <a:latin typeface="Courier"/>
+              </a:rPr>
+              <a:t>* method - Optional. Specifies either 
+*          DISCRETE or LOG chaining 
+*          method {DISCRETE, LOG}.  
+*          Default=DISCRETE
+* dateColumn - Optional. Date column in
+*              Data Set. Default=DATE
+* outData - Optional. Output Data Set 
+*           with active premium.  
+*           Default="active_premium"</a:t>
+            </a:r>
+          </a:p>
+        </p:txBody>
+      </p:sp>
+    </p:spTree>
+  </p:cSld>
+</p:sld>
+</file>
+
+<file path=ppt/slides/slide24.xml><?xml version="1.0" encoding="utf-8"?>
+<p:sld xmlns:a="http://schemas.openxmlformats.org/drawingml/2006/main" xmlns:r="http://schemas.openxmlformats.org/officeDocument/2006/relationships" xmlns:p="http://schemas.openxmlformats.org/presentationml/2006/main">
+  <p:cSld>
+    <p:spTree>
+      <p:nvGrpSpPr>
+        <p:cNvPr id="1" name=""/>
+        <p:cNvGrpSpPr/>
+        <p:nvPr/>
+      </p:nvGrpSpPr>
+      <p:grpSpPr>
+        <a:xfrm>
+          <a:off x="0" y="0"/>
+          <a:ext cx="0" cy="0"/>
+          <a:chOff x="0" y="0"/>
+          <a:chExt cx="0" cy="0"/>
+        </a:xfrm>
+      </p:grpSpPr>
+      <p:sp>
+        <p:nvSpPr>
+          <p:cNvPr id="2" name="Title 1"/>
+          <p:cNvSpPr>
+            <a:spLocks noGrp="1"/>
+          </p:cNvSpPr>
+          <p:nvPr>
+            <p:ph type="title"/>
+          </p:nvPr>
+        </p:nvSpPr>
+        <p:spPr/>
+        <p:txBody>
+          <a:bodyPr/>
+          <a:lstStyle/>
+          <a:p>
+            <a:pPr lvl="0" marL="0" indent="0">
+              <a:buNone/>
+            </a:pPr>
+            <a:r>
+              <a:rPr/>
+              <a:t>Documentation</a:t>
+            </a:r>
+            <a:r>
+              <a:rPr/>
+              <a:t> </a:t>
+            </a:r>
+            <a:r>
+              <a:rPr/>
+              <a:t>example</a:t>
+            </a:r>
+            <a:r>
+              <a:rPr/>
+              <a:t> </a:t>
+            </a:r>
+            <a:r>
+              <a:rPr/>
+              <a:t>#2,</a:t>
+            </a:r>
+            <a:r>
+              <a:rPr/>
+              <a:t> </a:t>
+            </a:r>
+            <a:r>
+              <a:rPr/>
+              <a:t>snippet</a:t>
+            </a:r>
+            <a:r>
+              <a:rPr/>
+              <a:t> </a:t>
+            </a:r>
+            <a:r>
+              <a:rPr/>
+              <a:t>4</a:t>
+            </a:r>
+            <a:r>
+              <a:rPr/>
+              <a:t> </a:t>
+            </a:r>
+            <a:r>
+              <a:rPr/>
+              <a:t>of</a:t>
+            </a:r>
+            <a:r>
+              <a:rPr/>
+              <a:t> </a:t>
+            </a:r>
+            <a:r>
+              <a:rPr/>
+              <a:t>4.</a:t>
+            </a:r>
+          </a:p>
+        </p:txBody>
+      </p:sp>
+      <p:sp>
+        <p:nvSpPr>
+          <p:cNvPr id="3" name="Content Placeholder 2"/>
+          <p:cNvSpPr>
+            <a:spLocks noGrp="1"/>
+          </p:cNvSpPr>
+          <p:nvPr>
+            <p:ph idx="1"/>
+          </p:nvPr>
+        </p:nvSpPr>
+        <p:spPr/>
+        <p:txBody>
+          <a:bodyPr/>
+          <a:lstStyle/>
+          <a:p>
+            <a:pPr lvl="0" marL="1270000" indent="0">
+              <a:buNone/>
+            </a:pPr>
+            <a:r>
+              <a:rPr sz="1800">
+                <a:latin typeface="Courier"/>
+              </a:rPr>
+              <a:t>* MODIFIED:
+* 7/22/2015 – CJ - Initial Creation
+* 3/05/2016 – RM - Comments modification  
+* 3/09/2016 - QY - Parameter consistency 
+*
+* Copyright (c) 2015 by The Financial Risk Group,
+* Cary, NC, USA.
+*----------------------------------------------*/</a:t>
+            </a:r>
+          </a:p>
+          <a:p>
+            <a:pPr lvl="1"/>
+            <a:r>
+              <a:rPr/>
+              <a:t>Source: </a:t>
+            </a:r>
+            <a:r>
+              <a:rPr>
+                <a:hlinkClick r:id="rId2"/>
+              </a:rPr>
+              <a:t>https://github.com/FinancialRiskGroup/SASPerformanceAnalytics</a:t>
+            </a:r>
+          </a:p>
+        </p:txBody>
+      </p:sp>
+    </p:spTree>
+  </p:cSld>
+</p:sld>
+</file>
+
+<file path=ppt/slides/slide25.xml><?xml version="1.0" encoding="utf-8"?>
+<p:sld xmlns:a="http://schemas.openxmlformats.org/drawingml/2006/main" xmlns:r="http://schemas.openxmlformats.org/officeDocument/2006/relationships" xmlns:p="http://schemas.openxmlformats.org/presentationml/2006/main">
+  <p:cSld>
+    <p:spTree>
+      <p:nvGrpSpPr>
+        <p:cNvPr id="1" name=""/>
+        <p:cNvGrpSpPr/>
+        <p:nvPr/>
+      </p:nvGrpSpPr>
+      <p:grpSpPr>
+        <a:xfrm>
+          <a:off x="0" y="0"/>
+          <a:ext cx="0" cy="0"/>
+          <a:chOff x="0" y="0"/>
+          <a:chExt cx="0" cy="0"/>
+        </a:xfrm>
+      </p:grpSpPr>
+      <p:sp>
+        <p:nvSpPr>
+          <p:cNvPr id="2" name="Title 1"/>
+          <p:cNvSpPr>
+            <a:spLocks noGrp="1"/>
+          </p:cNvSpPr>
+          <p:nvPr>
+            <p:ph type="title"/>
+          </p:nvPr>
+        </p:nvSpPr>
+        <p:spPr/>
+        <p:txBody>
+          <a:bodyPr/>
+          <a:lstStyle/>
+          <a:p>
+            <a:pPr lvl="0" marL="0" indent="0">
+              <a:buNone/>
+            </a:pPr>
+            <a:r>
+              <a:rPr/>
+              <a:t>On</a:t>
+            </a:r>
+            <a:r>
+              <a:rPr/>
+              <a:t> </a:t>
+            </a:r>
+            <a:r>
+              <a:rPr/>
+              <a:t>your</a:t>
+            </a:r>
+            <a:r>
+              <a:rPr/>
+              <a:t> </a:t>
+            </a:r>
+            <a:r>
+              <a:rPr/>
+              <a:t>own</a:t>
+            </a:r>
+            <a:r>
+              <a:rPr/>
+              <a:t> </a:t>
+            </a:r>
+            <a:r>
+              <a:rPr/>
+              <a:t>(1</a:t>
+            </a:r>
+            <a:r>
+              <a:rPr/>
+              <a:t> </a:t>
+            </a:r>
+            <a:r>
+              <a:rPr/>
+              <a:t>of</a:t>
+            </a:r>
+            <a:r>
+              <a:rPr/>
+              <a:t> </a:t>
+            </a:r>
+            <a:r>
+              <a:rPr/>
+              <a:t>2)</a:t>
             </a:r>
           </a:p>
         </p:txBody>
@@ -22831,7 +23459,7 @@
 </p:sld>
 </file>
 
-<file path=ppt/slides/slide23.xml><?xml version="1.0" encoding="utf-8"?>
+<file path=ppt/slides/slide26.xml><?xml version="1.0" encoding="utf-8"?>
 <p:sld xmlns:a="http://schemas.openxmlformats.org/drawingml/2006/main" xmlns:r="http://schemas.openxmlformats.org/officeDocument/2006/relationships" xmlns:p="http://schemas.openxmlformats.org/presentationml/2006/main">
   <p:cSld>
     <p:spTree>
@@ -22867,10 +23495,48 @@
               <a:buNone/>
             </a:pPr>
             <a:r>
-              <a:rPr>
-                <a:hlinkClick r:id="rId2"/>
-              </a:rPr>
-              <a:t>https://www.hhs.gov/opa/performance-measures/claims-data-sas-program-instructions/index.html</a:t>
+              <a:rPr/>
+              <a:t>On</a:t>
+            </a:r>
+            <a:r>
+              <a:rPr/>
+              <a:t> </a:t>
+            </a:r>
+            <a:r>
+              <a:rPr/>
+              <a:t>your</a:t>
+            </a:r>
+            <a:r>
+              <a:rPr/>
+              <a:t> </a:t>
+            </a:r>
+            <a:r>
+              <a:rPr/>
+              <a:t>own</a:t>
+            </a:r>
+            <a:r>
+              <a:rPr/>
+              <a:t> </a:t>
+            </a:r>
+            <a:r>
+              <a:rPr/>
+              <a:t>(2</a:t>
+            </a:r>
+            <a:r>
+              <a:rPr/>
+              <a:t> </a:t>
+            </a:r>
+            <a:r>
+              <a:rPr/>
+              <a:t>of</a:t>
+            </a:r>
+            <a:r>
+              <a:rPr/>
+              <a:t> </a:t>
+            </a:r>
+            <a:r>
+              <a:rPr/>
+              <a:t>2)</a:t>
             </a:r>
           </a:p>
         </p:txBody>
@@ -22890,48 +23556,40 @@
           <a:bodyPr/>
           <a:lstStyle/>
           <a:p>
-            <a:pPr lvl="0" marL="1270000" indent="0">
-              <a:buNone/>
-            </a:pPr>
-            <a:r>
-              <a:rPr sz="1800">
-                <a:latin typeface="Courier"/>
+            <a:pPr lvl="1"/>
+            <a:r>
+              <a:rPr/>
+              <a:t>Evaluate the documentation shown above, available at</a:t>
+            </a:r>
+          </a:p>
+          <a:p>
+            <a:pPr lvl="2"/>
+            <a:r>
+              <a:rPr>
+                <a:hlinkClick r:id="rId2"/>
               </a:rPr>
-              <a:t>/*
-________________________________________________________________________________
-   00.setup.sas 
-   OPA Measure Calculations
-   Step 0: Define macro variables
-   Summary  : Define macro variables used in subsequent programs.
-              User enters environment- and data-specific info (directories,
-              variable names). User specifies whether to perform measure 
-              calculations on postpartum women (and number of days postpartum). 
-              Measure calculations will be performed on all women population 
-              by default. User can also specify demographic variables for 
-              stratification of final measures.
-   Data Reqs: 1) A sas data file containing women with one calendar year of claims
-              2) Every record must contain at least: 
-                  a) patient ID 
-                  b) patient date of birth (or age at service date)
-                  c) date of service
-   Authors  : P. Hastings / phil -at- farharbor -dot- com
-            : H. Monti / holly -at- farharbor -dot- com  
-            : Based on original code by B. Frederiksen -at- DHHS/OPA
-   Version  : 2.01
-   Date     : 2019-02-26
-   Revisions: Now using contraceptive provision to describe measures.  
-              Updated OPA contact in setup helper. Updated names of revised claims code 
-              lookup tables. Updated LARC flag to exclude surveillance codes. 
-              Separated IUD and implant methods from LARC for MostMod report only. 
-              Updated the live birth date of service as the first date rather than 
-              the last date of live birth claim in the postpartum period. 
-              Added a flag for each contraceptive method used during the time period,
-              and added these variables to final dataset. Calculating measures based on
-              2018 specifications. 
-   History  : 2016-12-19(1.00), 2017-02-22(1.01), 2017-05-17(1.02), 
-              2018-04-20(1.03), 2018-08-20(1.03a)
-________________________________________________________________________________
-*/</a:t>
+              <a:t>https://www.hhs.gov/opa/performance-measures/claims-data-sas-program-instructions/index.html</a:t>
+            </a:r>
+          </a:p>
+          <a:p>
+            <a:pPr lvl="1"/>
+            <a:r>
+              <a:rPr/>
+              <a:t>What elements did these programmers include in their documentation?</a:t>
+            </a:r>
+          </a:p>
+          <a:p>
+            <a:pPr lvl="1"/>
+            <a:r>
+              <a:rPr/>
+              <a:t>What elements did the programmers leave out?</a:t>
+            </a:r>
+          </a:p>
+          <a:p>
+            <a:pPr lvl="2"/>
+            <a:r>
+              <a:rPr/>
+              <a:t>Are any of the omissions critical?</a:t>
             </a:r>
           </a:p>
           <a:p>

</xml_diff>